<commit_message>
Modif du PPT et du GANT et ajout de texte dans école
</commit_message>
<xml_diff>
--- a/Powerpoint.pptx
+++ b/Powerpoint.pptx
@@ -8,7 +8,11 @@
     <p:sldId id="256" r:id="rId2"/>
     <p:sldId id="257" r:id="rId3"/>
     <p:sldId id="259" r:id="rId4"/>
-    <p:sldId id="258" r:id="rId5"/>
+    <p:sldId id="262" r:id="rId5"/>
+    <p:sldId id="258" r:id="rId6"/>
+    <p:sldId id="260" r:id="rId7"/>
+    <p:sldId id="261" r:id="rId8"/>
+    <p:sldId id="263" r:id="rId9"/>
   </p:sldIdLst>
   <p:sldSz cx="12192000" cy="6858000"/>
   <p:notesSz cx="6858000" cy="9144000"/>
@@ -4220,6 +4224,89 @@
 <file path=ppt/slides/slide4.xml><?xml version="1.0" encoding="utf-8"?>
 <p:sld xmlns:a="http://schemas.openxmlformats.org/drawingml/2006/main" xmlns:r="http://schemas.openxmlformats.org/officeDocument/2006/relationships" xmlns:p="http://schemas.openxmlformats.org/presentationml/2006/main">
   <p:cSld>
+    <p:spTree>
+      <p:nvGrpSpPr>
+        <p:cNvPr id="1" name=""/>
+        <p:cNvGrpSpPr/>
+        <p:nvPr/>
+      </p:nvGrpSpPr>
+      <p:grpSpPr>
+        <a:xfrm>
+          <a:off x="0" y="0"/>
+          <a:ext cx="0" cy="0"/>
+          <a:chOff x="0" y="0"/>
+          <a:chExt cx="0" cy="0"/>
+        </a:xfrm>
+      </p:grpSpPr>
+      <p:sp>
+        <p:nvSpPr>
+          <p:cNvPr id="2" name="Titre 1">
+            <a:extLst>
+              <a:ext uri="{FF2B5EF4-FFF2-40B4-BE49-F238E27FC236}">
+                <a16:creationId xmlns:a16="http://schemas.microsoft.com/office/drawing/2014/main" id="{7F357055-4F0D-4438-9401-2F30282F269C}"/>
+              </a:ext>
+            </a:extLst>
+          </p:cNvPr>
+          <p:cNvSpPr>
+            <a:spLocks noGrp="1"/>
+          </p:cNvSpPr>
+          <p:nvPr>
+            <p:ph type="title"/>
+          </p:nvPr>
+        </p:nvSpPr>
+        <p:spPr/>
+        <p:txBody>
+          <a:bodyPr/>
+          <a:lstStyle/>
+          <a:p>
+            <a:r>
+              <a:rPr lang="fr-FR" dirty="0"/>
+              <a:t>Parti Clara</a:t>
+            </a:r>
+          </a:p>
+        </p:txBody>
+      </p:sp>
+      <p:sp>
+        <p:nvSpPr>
+          <p:cNvPr id="3" name="Espace réservé du contenu 2">
+            <a:extLst>
+              <a:ext uri="{FF2B5EF4-FFF2-40B4-BE49-F238E27FC236}">
+                <a16:creationId xmlns:a16="http://schemas.microsoft.com/office/drawing/2014/main" id="{0847074A-91CD-4F76-AC85-971EBB12C5F7}"/>
+              </a:ext>
+            </a:extLst>
+          </p:cNvPr>
+          <p:cNvSpPr>
+            <a:spLocks noGrp="1"/>
+          </p:cNvSpPr>
+          <p:nvPr>
+            <p:ph idx="1"/>
+          </p:nvPr>
+        </p:nvSpPr>
+        <p:spPr/>
+        <p:txBody>
+          <a:bodyPr/>
+          <a:lstStyle/>
+          <a:p>
+            <a:endParaRPr lang="fr-FR"/>
+          </a:p>
+        </p:txBody>
+      </p:sp>
+    </p:spTree>
+    <p:extLst>
+      <p:ext uri="{BB962C8B-B14F-4D97-AF65-F5344CB8AC3E}">
+        <p14:creationId xmlns:p14="http://schemas.microsoft.com/office/powerpoint/2010/main" val="2975665321"/>
+      </p:ext>
+    </p:extLst>
+  </p:cSld>
+  <p:clrMapOvr>
+    <a:masterClrMapping/>
+  </p:clrMapOvr>
+</p:sld>
+</file>
+
+<file path=ppt/slides/slide5.xml><?xml version="1.0" encoding="utf-8"?>
+<p:sld xmlns:a="http://schemas.openxmlformats.org/drawingml/2006/main" xmlns:r="http://schemas.openxmlformats.org/officeDocument/2006/relationships" xmlns:p="http://schemas.openxmlformats.org/presentationml/2006/main">
+  <p:cSld>
     <p:bg>
       <p:bgPr>
         <a:solidFill>
@@ -4483,6 +4570,726 @@
     <p:extLst>
       <p:ext uri="{BB962C8B-B14F-4D97-AF65-F5344CB8AC3E}">
         <p14:creationId xmlns:p14="http://schemas.microsoft.com/office/powerpoint/2010/main" val="4006638164"/>
+      </p:ext>
+    </p:extLst>
+  </p:cSld>
+  <p:clrMapOvr>
+    <a:masterClrMapping/>
+  </p:clrMapOvr>
+</p:sld>
+</file>
+
+<file path=ppt/slides/slide6.xml><?xml version="1.0" encoding="utf-8"?>
+<p:sld xmlns:a="http://schemas.openxmlformats.org/drawingml/2006/main" xmlns:r="http://schemas.openxmlformats.org/officeDocument/2006/relationships" xmlns:p="http://schemas.openxmlformats.org/presentationml/2006/main">
+  <p:cSld>
+    <p:bg>
+      <p:bgPr>
+        <a:solidFill>
+          <a:schemeClr val="bg2"/>
+        </a:solidFill>
+        <a:effectLst/>
+      </p:bgPr>
+    </p:bg>
+    <p:spTree>
+      <p:nvGrpSpPr>
+        <p:cNvPr id="1" name=""/>
+        <p:cNvGrpSpPr/>
+        <p:nvPr/>
+      </p:nvGrpSpPr>
+      <p:grpSpPr>
+        <a:xfrm>
+          <a:off x="0" y="0"/>
+          <a:ext cx="0" cy="0"/>
+          <a:chOff x="0" y="0"/>
+          <a:chExt cx="0" cy="0"/>
+        </a:xfrm>
+      </p:grpSpPr>
+      <p:sp useBgFill="1">
+        <p:nvSpPr>
+          <p:cNvPr id="16" name="Rectangle 11">
+            <a:extLst>
+              <a:ext uri="{FF2B5EF4-FFF2-40B4-BE49-F238E27FC236}">
+                <a16:creationId xmlns:a16="http://schemas.microsoft.com/office/drawing/2014/main" id="{1399859F-F366-4AF3-B2CF-491BC512B06E}"/>
+              </a:ext>
+              <a:ext uri="{C183D7F6-B498-43B3-948B-1728B52AA6E4}">
+                <adec:decorative xmlns:adec="http://schemas.microsoft.com/office/drawing/2017/decorative" val="1"/>
+              </a:ext>
+            </a:extLst>
+          </p:cNvPr>
+          <p:cNvSpPr>
+            <a:spLocks noGrp="1" noRot="1" noChangeAspect="1" noMove="1" noResize="1" noEditPoints="1" noAdjustHandles="1" noChangeArrowheads="1" noChangeShapeType="1" noTextEdit="1"/>
+          </p:cNvSpPr>
+          <p:nvPr>
+            <p:extLst>
+              <p:ext uri="{386F3935-93C4-4BCD-93E2-E3B085C9AB24}">
+                <p16:designElem xmlns:p16="http://schemas.microsoft.com/office/powerpoint/2015/main" val="1"/>
+              </p:ext>
+            </p:extLst>
+          </p:nvPr>
+        </p:nvSpPr>
+        <p:spPr>
+          <a:xfrm>
+            <a:off x="0" y="0"/>
+            <a:ext cx="12192000" cy="6858000"/>
+          </a:xfrm>
+          <a:prstGeom prst="rect">
+            <a:avLst/>
+          </a:prstGeom>
+          <a:ln w="12700" cap="flat" cmpd="sng" algn="ctr">
+            <a:noFill/>
+            <a:prstDash val="solid"/>
+            <a:miter lim="800000"/>
+          </a:ln>
+          <a:effectLst/>
+          <a:extLst>
+            <a:ext uri="{91240B29-F687-4F45-9708-019B960494DF}">
+              <a14:hiddenLine xmlns:a14="http://schemas.microsoft.com/office/drawing/2010/main" w="12700" cap="flat" cmpd="sng" algn="ctr">
+                <a:solidFill>
+                  <a:schemeClr val="accent1">
+                    <a:shade val="50000"/>
+                  </a:schemeClr>
+                </a:solidFill>
+                <a:prstDash val="solid"/>
+                <a:miter lim="800000"/>
+              </a14:hiddenLine>
+            </a:ext>
+          </a:extLst>
+        </p:spPr>
+        <p:style>
+          <a:lnRef idx="2">
+            <a:schemeClr val="accent1">
+              <a:shade val="50000"/>
+            </a:schemeClr>
+          </a:lnRef>
+          <a:fillRef idx="1">
+            <a:schemeClr val="accent1"/>
+          </a:fillRef>
+          <a:effectRef idx="0">
+            <a:schemeClr val="accent1"/>
+          </a:effectRef>
+          <a:fontRef idx="minor">
+            <a:schemeClr val="lt1"/>
+          </a:fontRef>
+        </p:style>
+        <p:txBody>
+          <a:bodyPr rtlCol="0" anchor="ctr"/>
+          <a:lstStyle/>
+          <a:p>
+            <a:pPr algn="ctr"/>
+            <a:endParaRPr lang="en-US"/>
+          </a:p>
+        </p:txBody>
+      </p:sp>
+      <p:sp>
+        <p:nvSpPr>
+          <p:cNvPr id="2" name="Titre 1">
+            <a:extLst>
+              <a:ext uri="{FF2B5EF4-FFF2-40B4-BE49-F238E27FC236}">
+                <a16:creationId xmlns:a16="http://schemas.microsoft.com/office/drawing/2014/main" id="{B216C74B-0F53-4892-A581-35BAB8BE0530}"/>
+              </a:ext>
+            </a:extLst>
+          </p:cNvPr>
+          <p:cNvSpPr>
+            <a:spLocks noGrp="1"/>
+          </p:cNvSpPr>
+          <p:nvPr>
+            <p:ph type="title"/>
+          </p:nvPr>
+        </p:nvSpPr>
+        <p:spPr>
+          <a:xfrm>
+            <a:off x="448056" y="388800"/>
+            <a:ext cx="4694400" cy="2826000"/>
+          </a:xfrm>
+        </p:spPr>
+        <p:txBody>
+          <a:bodyPr>
+            <a:normAutofit/>
+          </a:bodyPr>
+          <a:lstStyle/>
+          <a:p>
+            <a:r>
+              <a:rPr lang="fr-FR"/>
+              <a:t>(Salim)</a:t>
+            </a:r>
+            <a:br>
+              <a:rPr lang="fr-FR"/>
+            </a:br>
+            <a:r>
+              <a:rPr lang="fr-FR"/>
+              <a:t>Page Cours</a:t>
+            </a:r>
+            <a:endParaRPr lang="fr-FR" dirty="0"/>
+          </a:p>
+        </p:txBody>
+      </p:sp>
+      <p:cxnSp>
+        <p:nvCxnSpPr>
+          <p:cNvPr id="17" name="Straight Connector 13">
+            <a:extLst>
+              <a:ext uri="{FF2B5EF4-FFF2-40B4-BE49-F238E27FC236}">
+                <a16:creationId xmlns:a16="http://schemas.microsoft.com/office/drawing/2014/main" id="{7F935FD8-9F2E-4F15-8ED9-1C692DA6F351}"/>
+              </a:ext>
+              <a:ext uri="{C183D7F6-B498-43B3-948B-1728B52AA6E4}">
+                <adec:decorative xmlns:adec="http://schemas.microsoft.com/office/drawing/2017/decorative" val="1"/>
+              </a:ext>
+            </a:extLst>
+          </p:cNvPr>
+          <p:cNvCxnSpPr>
+            <a:cxnSpLocks noGrp="1" noRot="1" noChangeAspect="1" noMove="1" noResize="1" noEditPoints="1" noAdjustHandles="1" noChangeArrowheads="1" noChangeShapeType="1"/>
+          </p:cNvCxnSpPr>
+          <p:nvPr>
+            <p:extLst>
+              <p:ext uri="{386F3935-93C4-4BCD-93E2-E3B085C9AB24}">
+                <p16:designElem xmlns:p16="http://schemas.microsoft.com/office/powerpoint/2015/main" val="1"/>
+              </p:ext>
+            </p:extLst>
+          </p:nvPr>
+        </p:nvCxnSpPr>
+        <p:spPr>
+          <a:xfrm>
+            <a:off x="5616000" y="450000"/>
+            <a:ext cx="0" cy="2764800"/>
+          </a:xfrm>
+          <a:prstGeom prst="line">
+            <a:avLst/>
+          </a:prstGeom>
+          <a:ln>
+            <a:solidFill>
+              <a:schemeClr val="tx2"/>
+            </a:solidFill>
+          </a:ln>
+        </p:spPr>
+        <p:style>
+          <a:lnRef idx="1">
+            <a:schemeClr val="accent1"/>
+          </a:lnRef>
+          <a:fillRef idx="0">
+            <a:schemeClr val="accent1"/>
+          </a:fillRef>
+          <a:effectRef idx="0">
+            <a:schemeClr val="accent1"/>
+          </a:effectRef>
+          <a:fontRef idx="minor">
+            <a:schemeClr val="tx1"/>
+          </a:fontRef>
+        </p:style>
+      </p:cxnSp>
+      <p:sp>
+        <p:nvSpPr>
+          <p:cNvPr id="3" name="Espace réservé du contenu 2">
+            <a:extLst>
+              <a:ext uri="{FF2B5EF4-FFF2-40B4-BE49-F238E27FC236}">
+                <a16:creationId xmlns:a16="http://schemas.microsoft.com/office/drawing/2014/main" id="{42C6B135-6C28-410B-9B37-7BD1966192F7}"/>
+              </a:ext>
+            </a:extLst>
+          </p:cNvPr>
+          <p:cNvSpPr>
+            <a:spLocks noGrp="1"/>
+          </p:cNvSpPr>
+          <p:nvPr>
+            <p:ph idx="1"/>
+          </p:nvPr>
+        </p:nvSpPr>
+        <p:spPr>
+          <a:xfrm>
+            <a:off x="6094800" y="323999"/>
+            <a:ext cx="5184000" cy="2887200"/>
+          </a:xfrm>
+        </p:spPr>
+        <p:txBody>
+          <a:bodyPr>
+            <a:normAutofit/>
+          </a:bodyPr>
+          <a:lstStyle/>
+          <a:p>
+            <a:r>
+              <a:rPr lang="fr-FR" dirty="0"/>
+              <a:t>Source prit des Cours</a:t>
+            </a:r>
+          </a:p>
+        </p:txBody>
+      </p:sp>
+      <p:pic>
+        <p:nvPicPr>
+          <p:cNvPr id="7" name="Image 6">
+            <a:extLst>
+              <a:ext uri="{FF2B5EF4-FFF2-40B4-BE49-F238E27FC236}">
+                <a16:creationId xmlns:a16="http://schemas.microsoft.com/office/drawing/2014/main" id="{99693033-5FB5-45D9-9F41-1E7636F438B7}"/>
+              </a:ext>
+            </a:extLst>
+          </p:cNvPr>
+          <p:cNvPicPr>
+            <a:picLocks noChangeAspect="1"/>
+          </p:cNvPicPr>
+          <p:nvPr/>
+        </p:nvPicPr>
+        <p:blipFill rotWithShape="1">
+          <a:blip r:embed="rId2"/>
+          <a:srcRect l="1341" r="31792"/>
+          <a:stretch/>
+        </p:blipFill>
+        <p:spPr>
+          <a:xfrm>
+            <a:off x="448056" y="3650400"/>
+            <a:ext cx="3295227" cy="2772000"/>
+          </a:xfrm>
+          <a:custGeom>
+            <a:avLst/>
+            <a:gdLst/>
+            <a:ahLst/>
+            <a:cxnLst/>
+            <a:rect l="l" t="t" r="r" b="b"/>
+            <a:pathLst>
+              <a:path w="3295227" h="2772000">
+                <a:moveTo>
+                  <a:pt x="0" y="0"/>
+                </a:moveTo>
+                <a:lnTo>
+                  <a:pt x="3295227" y="0"/>
+                </a:lnTo>
+                <a:lnTo>
+                  <a:pt x="3295227" y="2772000"/>
+                </a:lnTo>
+                <a:lnTo>
+                  <a:pt x="0" y="2772000"/>
+                </a:lnTo>
+                <a:close/>
+              </a:path>
+            </a:pathLst>
+          </a:custGeom>
+        </p:spPr>
+      </p:pic>
+      <p:pic>
+        <p:nvPicPr>
+          <p:cNvPr id="5" name="Image 4">
+            <a:extLst>
+              <a:ext uri="{FF2B5EF4-FFF2-40B4-BE49-F238E27FC236}">
+                <a16:creationId xmlns:a16="http://schemas.microsoft.com/office/drawing/2014/main" id="{82D118CE-2B21-4B4B-AD01-70F1885717F9}"/>
+              </a:ext>
+            </a:extLst>
+          </p:cNvPr>
+          <p:cNvPicPr>
+            <a:picLocks noChangeAspect="1"/>
+          </p:cNvPicPr>
+          <p:nvPr/>
+        </p:nvPicPr>
+        <p:blipFill rotWithShape="1">
+          <a:blip r:embed="rId3"/>
+          <a:srcRect b="17833"/>
+          <a:stretch/>
+        </p:blipFill>
+        <p:spPr>
+          <a:xfrm>
+            <a:off x="3925227" y="3643200"/>
+            <a:ext cx="7374013" cy="2772000"/>
+          </a:xfrm>
+          <a:custGeom>
+            <a:avLst/>
+            <a:gdLst/>
+            <a:ahLst/>
+            <a:cxnLst/>
+            <a:rect l="l" t="t" r="r" b="b"/>
+            <a:pathLst>
+              <a:path w="7374013" h="2772000">
+                <a:moveTo>
+                  <a:pt x="0" y="0"/>
+                </a:moveTo>
+                <a:lnTo>
+                  <a:pt x="7374013" y="0"/>
+                </a:lnTo>
+                <a:lnTo>
+                  <a:pt x="7374013" y="2772000"/>
+                </a:lnTo>
+                <a:lnTo>
+                  <a:pt x="0" y="2772000"/>
+                </a:lnTo>
+                <a:close/>
+              </a:path>
+            </a:pathLst>
+          </a:custGeom>
+        </p:spPr>
+      </p:pic>
+    </p:spTree>
+    <p:extLst>
+      <p:ext uri="{BB962C8B-B14F-4D97-AF65-F5344CB8AC3E}">
+        <p14:creationId xmlns:p14="http://schemas.microsoft.com/office/powerpoint/2010/main" val="1924210656"/>
+      </p:ext>
+    </p:extLst>
+  </p:cSld>
+  <p:clrMapOvr>
+    <a:masterClrMapping/>
+  </p:clrMapOvr>
+</p:sld>
+</file>
+
+<file path=ppt/slides/slide7.xml><?xml version="1.0" encoding="utf-8"?>
+<p:sld xmlns:a="http://schemas.openxmlformats.org/drawingml/2006/main" xmlns:r="http://schemas.openxmlformats.org/officeDocument/2006/relationships" xmlns:p="http://schemas.openxmlformats.org/presentationml/2006/main">
+  <p:cSld>
+    <p:bg>
+      <p:bgPr>
+        <a:solidFill>
+          <a:schemeClr val="bg2"/>
+        </a:solidFill>
+        <a:effectLst/>
+      </p:bgPr>
+    </p:bg>
+    <p:spTree>
+      <p:nvGrpSpPr>
+        <p:cNvPr id="1" name=""/>
+        <p:cNvGrpSpPr/>
+        <p:nvPr/>
+      </p:nvGrpSpPr>
+      <p:grpSpPr>
+        <a:xfrm>
+          <a:off x="0" y="0"/>
+          <a:ext cx="0" cy="0"/>
+          <a:chOff x="0" y="0"/>
+          <a:chExt cx="0" cy="0"/>
+        </a:xfrm>
+      </p:grpSpPr>
+      <p:sp useBgFill="1">
+        <p:nvSpPr>
+          <p:cNvPr id="12" name="Rectangle 11">
+            <a:extLst>
+              <a:ext uri="{FF2B5EF4-FFF2-40B4-BE49-F238E27FC236}">
+                <a16:creationId xmlns:a16="http://schemas.microsoft.com/office/drawing/2014/main" id="{BC40AE45-0F40-4658-AECB-189ADDFFCD61}"/>
+              </a:ext>
+              <a:ext uri="{C183D7F6-B498-43B3-948B-1728B52AA6E4}">
+                <adec:decorative xmlns:adec="http://schemas.microsoft.com/office/drawing/2017/decorative" val="1"/>
+              </a:ext>
+            </a:extLst>
+          </p:cNvPr>
+          <p:cNvSpPr>
+            <a:spLocks noGrp="1" noRot="1" noChangeAspect="1" noMove="1" noResize="1" noEditPoints="1" noAdjustHandles="1" noChangeArrowheads="1" noChangeShapeType="1" noTextEdit="1"/>
+          </p:cNvSpPr>
+          <p:nvPr>
+            <p:extLst>
+              <p:ext uri="{386F3935-93C4-4BCD-93E2-E3B085C9AB24}">
+                <p16:designElem xmlns:p16="http://schemas.microsoft.com/office/powerpoint/2015/main" val="1"/>
+              </p:ext>
+            </p:extLst>
+          </p:nvPr>
+        </p:nvSpPr>
+        <p:spPr>
+          <a:xfrm>
+            <a:off x="0" y="0"/>
+            <a:ext cx="12192000" cy="6858000"/>
+          </a:xfrm>
+          <a:prstGeom prst="rect">
+            <a:avLst/>
+          </a:prstGeom>
+          <a:ln w="12700" cap="flat" cmpd="sng" algn="ctr">
+            <a:noFill/>
+            <a:prstDash val="solid"/>
+            <a:miter lim="800000"/>
+          </a:ln>
+          <a:effectLst/>
+          <a:extLst>
+            <a:ext uri="{91240B29-F687-4F45-9708-019B960494DF}">
+              <a14:hiddenLine xmlns:a14="http://schemas.microsoft.com/office/drawing/2010/main" w="12700" cap="flat" cmpd="sng" algn="ctr">
+                <a:solidFill>
+                  <a:schemeClr val="accent1">
+                    <a:shade val="50000"/>
+                  </a:schemeClr>
+                </a:solidFill>
+                <a:prstDash val="solid"/>
+                <a:miter lim="800000"/>
+              </a14:hiddenLine>
+            </a:ext>
+          </a:extLst>
+        </p:spPr>
+        <p:style>
+          <a:lnRef idx="2">
+            <a:schemeClr val="accent1">
+              <a:shade val="50000"/>
+            </a:schemeClr>
+          </a:lnRef>
+          <a:fillRef idx="1">
+            <a:schemeClr val="accent1"/>
+          </a:fillRef>
+          <a:effectRef idx="0">
+            <a:schemeClr val="accent1"/>
+          </a:effectRef>
+          <a:fontRef idx="minor">
+            <a:schemeClr val="lt1"/>
+          </a:fontRef>
+        </p:style>
+        <p:txBody>
+          <a:bodyPr rtlCol="0" anchor="ctr"/>
+          <a:lstStyle/>
+          <a:p>
+            <a:pPr algn="ctr"/>
+            <a:endParaRPr lang="en-US"/>
+          </a:p>
+        </p:txBody>
+      </p:sp>
+      <p:sp>
+        <p:nvSpPr>
+          <p:cNvPr id="2" name="Titre 1">
+            <a:extLst>
+              <a:ext uri="{FF2B5EF4-FFF2-40B4-BE49-F238E27FC236}">
+                <a16:creationId xmlns:a16="http://schemas.microsoft.com/office/drawing/2014/main" id="{03A1B2C3-0E07-4E9F-B36C-831FA0E80CBE}"/>
+              </a:ext>
+            </a:extLst>
+          </p:cNvPr>
+          <p:cNvSpPr>
+            <a:spLocks noGrp="1"/>
+          </p:cNvSpPr>
+          <p:nvPr>
+            <p:ph type="title"/>
+          </p:nvPr>
+        </p:nvSpPr>
+        <p:spPr>
+          <a:xfrm>
+            <a:off x="448056" y="388800"/>
+            <a:ext cx="11300532" cy="986400"/>
+          </a:xfrm>
+        </p:spPr>
+        <p:txBody>
+          <a:bodyPr anchor="b">
+            <a:normAutofit/>
+          </a:bodyPr>
+          <a:lstStyle/>
+          <a:p>
+            <a:r>
+              <a:rPr lang="fr-FR" sz="6400"/>
+              <a:t>(Salim) Gant Project</a:t>
+            </a:r>
+          </a:p>
+        </p:txBody>
+      </p:sp>
+      <p:cxnSp>
+        <p:nvCxnSpPr>
+          <p:cNvPr id="14" name="Straight Connector 13">
+            <a:extLst>
+              <a:ext uri="{FF2B5EF4-FFF2-40B4-BE49-F238E27FC236}">
+                <a16:creationId xmlns:a16="http://schemas.microsoft.com/office/drawing/2014/main" id="{B32E796E-8D19-4926-B7B8-653B01939010}"/>
+              </a:ext>
+              <a:ext uri="{C183D7F6-B498-43B3-948B-1728B52AA6E4}">
+                <adec:decorative xmlns:adec="http://schemas.microsoft.com/office/drawing/2017/decorative" val="1"/>
+              </a:ext>
+            </a:extLst>
+          </p:cNvPr>
+          <p:cNvCxnSpPr>
+            <a:cxnSpLocks noGrp="1" noRot="1" noChangeAspect="1" noMove="1" noResize="1" noEditPoints="1" noAdjustHandles="1" noChangeArrowheads="1" noChangeShapeType="1"/>
+          </p:cNvCxnSpPr>
+          <p:nvPr>
+            <p:extLst>
+              <p:ext uri="{386F3935-93C4-4BCD-93E2-E3B085C9AB24}">
+                <p16:designElem xmlns:p16="http://schemas.microsoft.com/office/powerpoint/2015/main" val="1"/>
+              </p:ext>
+            </p:extLst>
+          </p:nvPr>
+        </p:nvCxnSpPr>
+        <p:spPr>
+          <a:xfrm>
+            <a:off x="450000" y="1609200"/>
+            <a:ext cx="11300400" cy="0"/>
+          </a:xfrm>
+          <a:prstGeom prst="line">
+            <a:avLst/>
+          </a:prstGeom>
+          <a:ln w="6350">
+            <a:solidFill>
+              <a:schemeClr val="tx2"/>
+            </a:solidFill>
+          </a:ln>
+        </p:spPr>
+        <p:style>
+          <a:lnRef idx="1">
+            <a:schemeClr val="accent1"/>
+          </a:lnRef>
+          <a:fillRef idx="0">
+            <a:schemeClr val="accent1"/>
+          </a:fillRef>
+          <a:effectRef idx="0">
+            <a:schemeClr val="accent1"/>
+          </a:effectRef>
+          <a:fontRef idx="minor">
+            <a:schemeClr val="tx1"/>
+          </a:fontRef>
+        </p:style>
+      </p:cxnSp>
+      <p:pic>
+        <p:nvPicPr>
+          <p:cNvPr id="5" name="Espace réservé du contenu 4">
+            <a:extLst>
+              <a:ext uri="{FF2B5EF4-FFF2-40B4-BE49-F238E27FC236}">
+                <a16:creationId xmlns:a16="http://schemas.microsoft.com/office/drawing/2014/main" id="{1B172DB2-9085-4A4D-9846-8DA9E4020AC5}"/>
+              </a:ext>
+            </a:extLst>
+          </p:cNvPr>
+          <p:cNvPicPr>
+            <a:picLocks noChangeAspect="1"/>
+          </p:cNvPicPr>
+          <p:nvPr/>
+        </p:nvPicPr>
+        <p:blipFill>
+          <a:blip r:embed="rId2"/>
+          <a:stretch>
+            <a:fillRect/>
+          </a:stretch>
+        </p:blipFill>
+        <p:spPr>
+          <a:xfrm>
+            <a:off x="708671" y="2059200"/>
+            <a:ext cx="6857444" cy="3891600"/>
+          </a:xfrm>
+          <a:prstGeom prst="rect">
+            <a:avLst/>
+          </a:prstGeom>
+        </p:spPr>
+      </p:pic>
+      <p:sp>
+        <p:nvSpPr>
+          <p:cNvPr id="9" name="Content Placeholder 8">
+            <a:extLst>
+              <a:ext uri="{FF2B5EF4-FFF2-40B4-BE49-F238E27FC236}">
+                <a16:creationId xmlns:a16="http://schemas.microsoft.com/office/drawing/2014/main" id="{EDCB9326-185E-4D74-AC62-092926785C78}"/>
+              </a:ext>
+            </a:extLst>
+          </p:cNvPr>
+          <p:cNvSpPr>
+            <a:spLocks noGrp="1"/>
+          </p:cNvSpPr>
+          <p:nvPr>
+            <p:ph idx="1"/>
+          </p:nvPr>
+        </p:nvSpPr>
+        <p:spPr>
+          <a:xfrm>
+            <a:off x="8256588" y="1944000"/>
+            <a:ext cx="3490212" cy="4006800"/>
+          </a:xfrm>
+        </p:spPr>
+        <p:txBody>
+          <a:bodyPr>
+            <a:normAutofit/>
+          </a:bodyPr>
+          <a:lstStyle/>
+          <a:p>
+            <a:r>
+              <a:rPr lang="en-US" dirty="0" err="1"/>
+              <a:t>Création</a:t>
+            </a:r>
+            <a:r>
+              <a:rPr lang="en-US" dirty="0"/>
+              <a:t> de </a:t>
+            </a:r>
+            <a:r>
+              <a:rPr lang="en-US" dirty="0" err="1"/>
+              <a:t>tâches</a:t>
+            </a:r>
+            <a:endParaRPr lang="en-US" dirty="0"/>
+          </a:p>
+          <a:p>
+            <a:r>
+              <a:rPr lang="en-US" dirty="0"/>
+              <a:t>Gestion du temps</a:t>
+            </a:r>
+          </a:p>
+          <a:p>
+            <a:r>
+              <a:rPr lang="fr-FR" noProof="1"/>
+              <a:t>Organisation des tâches </a:t>
+            </a:r>
+          </a:p>
+          <a:p>
+            <a:pPr marL="1944" indent="0">
+              <a:buNone/>
+            </a:pPr>
+            <a:endParaRPr lang="fr-FR" noProof="1"/>
+          </a:p>
+        </p:txBody>
+      </p:sp>
+    </p:spTree>
+    <p:extLst>
+      <p:ext uri="{BB962C8B-B14F-4D97-AF65-F5344CB8AC3E}">
+        <p14:creationId xmlns:p14="http://schemas.microsoft.com/office/powerpoint/2010/main" val="2228073764"/>
+      </p:ext>
+    </p:extLst>
+  </p:cSld>
+  <p:clrMapOvr>
+    <a:masterClrMapping/>
+  </p:clrMapOvr>
+</p:sld>
+</file>
+
+<file path=ppt/slides/slide8.xml><?xml version="1.0" encoding="utf-8"?>
+<p:sld xmlns:a="http://schemas.openxmlformats.org/drawingml/2006/main" xmlns:r="http://schemas.openxmlformats.org/officeDocument/2006/relationships" xmlns:p="http://schemas.openxmlformats.org/presentationml/2006/main">
+  <p:cSld>
+    <p:spTree>
+      <p:nvGrpSpPr>
+        <p:cNvPr id="1" name=""/>
+        <p:cNvGrpSpPr/>
+        <p:nvPr/>
+      </p:nvGrpSpPr>
+      <p:grpSpPr>
+        <a:xfrm>
+          <a:off x="0" y="0"/>
+          <a:ext cx="0" cy="0"/>
+          <a:chOff x="0" y="0"/>
+          <a:chExt cx="0" cy="0"/>
+        </a:xfrm>
+      </p:grpSpPr>
+      <p:sp>
+        <p:nvSpPr>
+          <p:cNvPr id="2" name="Titre 1">
+            <a:extLst>
+              <a:ext uri="{FF2B5EF4-FFF2-40B4-BE49-F238E27FC236}">
+                <a16:creationId xmlns:a16="http://schemas.microsoft.com/office/drawing/2014/main" id="{F321C542-9A91-4943-B9AB-656B5F064693}"/>
+              </a:ext>
+            </a:extLst>
+          </p:cNvPr>
+          <p:cNvSpPr>
+            <a:spLocks noGrp="1"/>
+          </p:cNvSpPr>
+          <p:nvPr>
+            <p:ph type="title"/>
+          </p:nvPr>
+        </p:nvSpPr>
+        <p:spPr/>
+        <p:txBody>
+          <a:bodyPr/>
+          <a:lstStyle/>
+          <a:p>
+            <a:r>
+              <a:rPr lang="fr-FR"/>
+              <a:t>Partie Tom</a:t>
+            </a:r>
+          </a:p>
+        </p:txBody>
+      </p:sp>
+      <p:sp>
+        <p:nvSpPr>
+          <p:cNvPr id="3" name="Espace réservé du contenu 2">
+            <a:extLst>
+              <a:ext uri="{FF2B5EF4-FFF2-40B4-BE49-F238E27FC236}">
+                <a16:creationId xmlns:a16="http://schemas.microsoft.com/office/drawing/2014/main" id="{9CCF53EB-0FC2-457A-A18C-3AE5E131DC15}"/>
+              </a:ext>
+            </a:extLst>
+          </p:cNvPr>
+          <p:cNvSpPr>
+            <a:spLocks noGrp="1"/>
+          </p:cNvSpPr>
+          <p:nvPr>
+            <p:ph idx="1"/>
+          </p:nvPr>
+        </p:nvSpPr>
+        <p:spPr/>
+        <p:txBody>
+          <a:bodyPr/>
+          <a:lstStyle/>
+          <a:p>
+            <a:endParaRPr lang="fr-FR"/>
+          </a:p>
+        </p:txBody>
+      </p:sp>
+    </p:spTree>
+    <p:extLst>
+      <p:ext uri="{BB962C8B-B14F-4D97-AF65-F5344CB8AC3E}">
+        <p14:creationId xmlns:p14="http://schemas.microsoft.com/office/powerpoint/2010/main" val="2297454114"/>
       </p:ext>
     </p:extLst>
   </p:cSld>

</xml_diff>